<commit_message>
Added football rules slides
Created couple of slides to provide basic introduction to football rules and types of plays
</commit_message>
<xml_diff>
--- a/docs/Project Presentation/NFL_Database_Presentation.pptx
+++ b/docs/Project Presentation/NFL_Database_Presentation.pptx
@@ -7,16 +7,18 @@
     <p:sldMasterId id="2147493647" r:id="rId5"/>
   </p:sldMasterIdLst>
   <p:notesMasterIdLst>
-    <p:notesMasterId r:id="rId13"/>
+    <p:notesMasterId r:id="rId15"/>
   </p:notesMasterIdLst>
   <p:sldIdLst>
     <p:sldId id="256" r:id="rId6"/>
     <p:sldId id="303" r:id="rId7"/>
     <p:sldId id="292" r:id="rId8"/>
-    <p:sldId id="304" r:id="rId9"/>
-    <p:sldId id="305" r:id="rId10"/>
-    <p:sldId id="306" r:id="rId11"/>
-    <p:sldId id="307" r:id="rId12"/>
+    <p:sldId id="308" r:id="rId9"/>
+    <p:sldId id="309" r:id="rId10"/>
+    <p:sldId id="304" r:id="rId11"/>
+    <p:sldId id="305" r:id="rId12"/>
+    <p:sldId id="306" r:id="rId13"/>
+    <p:sldId id="307" r:id="rId14"/>
   </p:sldIdLst>
   <p:sldSz cx="9144000" cy="5143500" type="screen16x9"/>
   <p:notesSz cx="6858000" cy="9144000"/>
@@ -320,7 +322,7 @@
               <a:pPr>
                 <a:defRPr/>
               </a:pPr>
-              <a:t>5/5/2024</a:t>
+              <a:t>5/6/2024</a:t>
             </a:fld>
             <a:endParaRPr lang="en-US"/>
           </a:p>
@@ -994,7 +996,7 @@
               <a:pPr>
                 <a:defRPr/>
               </a:pPr>
-              <a:t>5/5/2024</a:t>
+              <a:t>5/6/2024</a:t>
             </a:fld>
             <a:endParaRPr lang="en-US" altLang="en-US"/>
           </a:p>
@@ -1207,7 +1209,7 @@
               <a:pPr>
                 <a:defRPr/>
               </a:pPr>
-              <a:t>5/5/2024</a:t>
+              <a:t>5/6/2024</a:t>
             </a:fld>
             <a:endParaRPr lang="en-US" altLang="en-US"/>
           </a:p>
@@ -1430,7 +1432,7 @@
               <a:pPr>
                 <a:defRPr/>
               </a:pPr>
-              <a:t>5/5/2024</a:t>
+              <a:t>5/6/2024</a:t>
             </a:fld>
             <a:endParaRPr lang="en-US" altLang="en-US"/>
           </a:p>
@@ -1713,7 +1715,7 @@
           <a:p>
             <a:fld id="{E50E5C25-56AA-4438-AD6E-26640E642245}" type="datetime1">
               <a:rPr lang="en-US" altLang="en-US" smtClean="0"/>
-              <a:t>5/5/2024</a:t>
+              <a:t>5/6/2024</a:t>
             </a:fld>
             <a:endParaRPr lang="en-US" altLang="en-US"/>
           </a:p>
@@ -1854,7 +1856,7 @@
           <a:p>
             <a:fld id="{67F32251-6916-45C2-A272-6283A0536015}" type="datetime1">
               <a:rPr lang="en-US" altLang="en-US" smtClean="0"/>
-              <a:t>5/5/2024</a:t>
+              <a:t>5/6/2024</a:t>
             </a:fld>
             <a:endParaRPr lang="en-US" altLang="en-US"/>
           </a:p>
@@ -2067,7 +2069,7 @@
           <a:p>
             <a:fld id="{1EC02D62-401F-4E79-A959-973DD4C4BB88}" type="datetime1">
               <a:rPr lang="en-US" altLang="en-US" smtClean="0"/>
-              <a:t>5/5/2024</a:t>
+              <a:t>5/6/2024</a:t>
             </a:fld>
             <a:endParaRPr lang="en-US" altLang="en-US"/>
           </a:p>
@@ -2320,7 +2322,7 @@
           <a:p>
             <a:fld id="{DC4C5EDA-51DA-4F30-9D87-867196E31CA7}" type="datetime1">
               <a:rPr lang="en-US" altLang="en-US" smtClean="0"/>
-              <a:t>5/5/2024</a:t>
+              <a:t>5/6/2024</a:t>
             </a:fld>
             <a:endParaRPr lang="en-US" altLang="en-US"/>
           </a:p>
@@ -2727,7 +2729,7 @@
           <a:p>
             <a:fld id="{D2012CD1-D44A-4319-A627-10B0DDD5EB0B}" type="datetime1">
               <a:rPr lang="en-US" altLang="en-US" smtClean="0"/>
-              <a:t>5/5/2024</a:t>
+              <a:t>5/6/2024</a:t>
             </a:fld>
             <a:endParaRPr lang="en-US" altLang="en-US"/>
           </a:p>
@@ -2897,7 +2899,7 @@
           <a:p>
             <a:fld id="{44FE3290-3C8F-4E6C-AC44-105D50CA132B}" type="datetime1">
               <a:rPr lang="en-US" altLang="en-US" smtClean="0"/>
-              <a:t>5/5/2024</a:t>
+              <a:t>5/6/2024</a:t>
             </a:fld>
             <a:endParaRPr lang="en-US" altLang="en-US"/>
           </a:p>
@@ -2960,7 +2962,7 @@
           <a:p>
             <a:fld id="{B5A37BB2-08EF-48DB-B15F-3284930E03D6}" type="datetime1">
               <a:rPr lang="en-US" altLang="en-US" smtClean="0"/>
-              <a:t>5/5/2024</a:t>
+              <a:t>5/6/2024</a:t>
             </a:fld>
             <a:endParaRPr lang="en-US" altLang="en-US"/>
           </a:p>
@@ -3215,7 +3217,7 @@
           <a:p>
             <a:fld id="{A7E9E4C9-05D0-4299-8997-4155B0A825E6}" type="datetime1">
               <a:rPr lang="en-US" altLang="en-US" smtClean="0"/>
-              <a:t>5/5/2024</a:t>
+              <a:t>5/6/2024</a:t>
             </a:fld>
             <a:endParaRPr lang="en-US" altLang="en-US"/>
           </a:p>
@@ -3367,7 +3369,7 @@
               <a:pPr>
                 <a:defRPr/>
               </a:pPr>
-              <a:t>5/5/2024</a:t>
+              <a:t>5/6/2024</a:t>
             </a:fld>
             <a:endParaRPr lang="en-US" altLang="en-US"/>
           </a:p>
@@ -3661,7 +3663,7 @@
           <a:p>
             <a:fld id="{D717D05F-7A65-46D0-979F-093BDE2DBDEF}" type="datetime1">
               <a:rPr lang="en-US" altLang="en-US" smtClean="0"/>
-              <a:t>5/5/2024</a:t>
+              <a:t>5/6/2024</a:t>
             </a:fld>
             <a:endParaRPr lang="en-US" altLang="en-US"/>
           </a:p>
@@ -3823,7 +3825,7 @@
           <a:p>
             <a:fld id="{55DF9BD9-DAFE-4A80-A823-DFF01A0C119F}" type="datetime1">
               <a:rPr lang="en-US" altLang="en-US" smtClean="0"/>
-              <a:t>5/5/2024</a:t>
+              <a:t>5/6/2024</a:t>
             </a:fld>
             <a:endParaRPr lang="en-US" altLang="en-US"/>
           </a:p>
@@ -3973,7 +3975,7 @@
           <a:p>
             <a:fld id="{477543E7-97B5-4574-B373-7D0521B8F418}" type="datetime1">
               <a:rPr lang="en-US" altLang="en-US" smtClean="0"/>
-              <a:t>5/5/2024</a:t>
+              <a:t>5/6/2024</a:t>
             </a:fld>
             <a:endParaRPr lang="en-US" altLang="en-US"/>
           </a:p>
@@ -4181,7 +4183,7 @@
           <a:p>
             <a:fld id="{EA10C001-7378-4DAD-9F44-DC6AA92FE8CF}" type="datetime1">
               <a:rPr lang="en-US" altLang="en-US" smtClean="0"/>
-              <a:t>5/5/2024</a:t>
+              <a:t>5/6/2024</a:t>
             </a:fld>
             <a:endParaRPr lang="en-US" altLang="en-US"/>
           </a:p>
@@ -4404,7 +4406,7 @@
           <a:p>
             <a:fld id="{90A0E91D-AA81-4926-9A54-B28918612F01}" type="datetime1">
               <a:rPr lang="en-US" altLang="en-US" smtClean="0"/>
-              <a:t>5/5/2024</a:t>
+              <a:t>5/6/2024</a:t>
             </a:fld>
             <a:endParaRPr lang="en-US" altLang="en-US"/>
           </a:p>
@@ -4686,7 +4688,7 @@
           <a:p>
             <a:fld id="{47F791DC-7B58-46F7-A1B0-D56EEA83221C}" type="datetime1">
               <a:rPr lang="en-US" altLang="en-US" smtClean="0"/>
-              <a:t>5/5/2024</a:t>
+              <a:t>5/6/2024</a:t>
             </a:fld>
             <a:endParaRPr lang="en-US" altLang="en-US"/>
           </a:p>
@@ -4986,7 +4988,7 @@
           <a:p>
             <a:fld id="{CEBF0440-8247-4136-97B9-8B41AA6C8536}" type="datetime1">
               <a:rPr lang="en-US" altLang="en-US" smtClean="0"/>
-              <a:t>5/5/2024</a:t>
+              <a:t>5/6/2024</a:t>
             </a:fld>
             <a:endParaRPr lang="en-US" altLang="en-US"/>
           </a:p>
@@ -5457,7 +5459,7 @@
           <a:p>
             <a:fld id="{5B8244A5-54A8-4791-B32E-AD96B9812175}" type="datetime1">
               <a:rPr lang="en-US" altLang="en-US" smtClean="0"/>
-              <a:t>5/5/2024</a:t>
+              <a:t>5/6/2024</a:t>
             </a:fld>
             <a:endParaRPr lang="en-US" altLang="en-US"/>
           </a:p>
@@ -5630,7 +5632,7 @@
           <a:p>
             <a:fld id="{75D2BB9B-578B-4216-8B17-0AE947C5976D}" type="datetime1">
               <a:rPr lang="en-US" altLang="en-US" smtClean="0"/>
-              <a:t>5/5/2024</a:t>
+              <a:t>5/6/2024</a:t>
             </a:fld>
             <a:endParaRPr lang="en-US" altLang="en-US"/>
           </a:p>
@@ -5803,7 +5805,7 @@
           <a:p>
             <a:fld id="{D3F7117F-74BD-4C0E-95BB-065470FB80E4}" type="datetime1">
               <a:rPr lang="en-US" altLang="en-US" smtClean="0"/>
-              <a:t>5/5/2024</a:t>
+              <a:t>5/6/2024</a:t>
             </a:fld>
             <a:endParaRPr lang="en-US" altLang="en-US"/>
           </a:p>
@@ -6091,7 +6093,7 @@
               <a:pPr>
                 <a:defRPr/>
               </a:pPr>
-              <a:t>5/5/2024</a:t>
+              <a:t>5/6/2024</a:t>
             </a:fld>
             <a:endParaRPr lang="en-US" altLang="en-US"/>
           </a:p>
@@ -6405,7 +6407,7 @@
           <a:p>
             <a:fld id="{0B6DCB02-C3ED-439B-9BC5-8A766F38DD0C}" type="datetime1">
               <a:rPr lang="en-US" altLang="en-US" smtClean="0"/>
-              <a:t>5/5/2024</a:t>
+              <a:t>5/6/2024</a:t>
             </a:fld>
             <a:endParaRPr lang="en-US" altLang="en-US"/>
           </a:p>
@@ -6704,7 +6706,7 @@
           <a:p>
             <a:fld id="{7BEF7774-06E3-4B6E-A02C-0698D9521A63}" type="datetime1">
               <a:rPr lang="en-US" altLang="en-US" smtClean="0"/>
-              <a:t>5/5/2024</a:t>
+              <a:t>5/6/2024</a:t>
             </a:fld>
             <a:endParaRPr lang="en-US" altLang="en-US"/>
           </a:p>
@@ -6892,7 +6894,7 @@
           <a:p>
             <a:fld id="{10814916-2284-4DC6-85F3-E9D769B30417}" type="datetime1">
               <a:rPr lang="en-US" altLang="en-US" smtClean="0"/>
-              <a:t>5/5/2024</a:t>
+              <a:t>5/6/2024</a:t>
             </a:fld>
             <a:endParaRPr lang="en-US" altLang="en-US"/>
           </a:p>
@@ -7148,7 +7150,7 @@
           <a:p>
             <a:fld id="{A063EDB7-6E96-468D-98AD-385D8C1330C6}" type="datetime1">
               <a:rPr lang="en-US" altLang="en-US" smtClean="0"/>
-              <a:t>5/5/2024</a:t>
+              <a:t>5/6/2024</a:t>
             </a:fld>
             <a:endParaRPr lang="en-US" altLang="en-US"/>
           </a:p>
@@ -7476,7 +7478,7 @@
               <a:pPr>
                 <a:defRPr/>
               </a:pPr>
-              <a:t>5/5/2024</a:t>
+              <a:t>5/6/2024</a:t>
             </a:fld>
             <a:endParaRPr lang="en-US" altLang="en-US"/>
           </a:p>
@@ -7940,7 +7942,7 @@
               <a:pPr>
                 <a:defRPr/>
               </a:pPr>
-              <a:t>5/5/2024</a:t>
+              <a:t>5/6/2024</a:t>
             </a:fld>
             <a:endParaRPr lang="en-US" altLang="en-US"/>
           </a:p>
@@ -8107,7 +8109,7 @@
               <a:pPr>
                 <a:defRPr/>
               </a:pPr>
-              <a:t>5/5/2024</a:t>
+              <a:t>5/6/2024</a:t>
             </a:fld>
             <a:endParaRPr lang="en-US" altLang="en-US"/>
           </a:p>
@@ -8247,7 +8249,7 @@
               <a:pPr>
                 <a:defRPr/>
               </a:pPr>
-              <a:t>5/5/2024</a:t>
+              <a:t>5/6/2024</a:t>
             </a:fld>
             <a:endParaRPr lang="en-US" altLang="en-US"/>
           </a:p>
@@ -8567,7 +8569,7 @@
               <a:pPr>
                 <a:defRPr/>
               </a:pPr>
-              <a:t>5/5/2024</a:t>
+              <a:t>5/6/2024</a:t>
             </a:fld>
             <a:endParaRPr lang="en-US" altLang="en-US"/>
           </a:p>
@@ -8871,7 +8873,7 @@
               <a:pPr>
                 <a:defRPr/>
               </a:pPr>
-              <a:t>5/5/2024</a:t>
+              <a:t>5/6/2024</a:t>
             </a:fld>
             <a:endParaRPr lang="en-US" altLang="en-US"/>
           </a:p>
@@ -9187,7 +9189,7 @@
               <a:pPr>
                 <a:defRPr/>
               </a:pPr>
-              <a:t>5/5/2024</a:t>
+              <a:t>5/6/2024</a:t>
             </a:fld>
             <a:endParaRPr lang="en-US" altLang="en-US"/>
           </a:p>
@@ -9947,7 +9949,7 @@
           <a:p>
             <a:fld id="{4A7B1C05-EA21-4143-BF9B-5A7AE622790B}" type="datetime1">
               <a:rPr lang="en-US" altLang="en-US" smtClean="0"/>
-              <a:t>5/5/2024</a:t>
+              <a:t>5/6/2024</a:t>
             </a:fld>
             <a:endParaRPr lang="en-US" altLang="en-US"/>
           </a:p>
@@ -10601,7 +10603,7 @@
           <a:p>
             <a:fld id="{DB56B676-FD35-4A81-AE7E-A88C163C26B0}" type="datetime1">
               <a:rPr lang="en-US" altLang="en-US" smtClean="0"/>
-              <a:t>5/5/2024</a:t>
+              <a:t>5/6/2024</a:t>
             </a:fld>
             <a:endParaRPr lang="en-US" altLang="en-US"/>
           </a:p>
@@ -13020,6 +13022,443 @@
           <p:cNvPr id="2" name="Title 1">
             <a:extLst>
               <a:ext uri="{FF2B5EF4-FFF2-40B4-BE49-F238E27FC236}">
+                <a16:creationId xmlns:a16="http://schemas.microsoft.com/office/drawing/2014/main" id="{7BDBD1BB-DCEE-F5DA-DB0B-132281701110}"/>
+              </a:ext>
+            </a:extLst>
+          </p:cNvPr>
+          <p:cNvSpPr>
+            <a:spLocks noGrp="1"/>
+          </p:cNvSpPr>
+          <p:nvPr>
+            <p:ph type="title"/>
+          </p:nvPr>
+        </p:nvSpPr>
+        <p:spPr>
+          <a:xfrm>
+            <a:off x="2829436" y="28250"/>
+            <a:ext cx="6247657" cy="457200"/>
+          </a:xfrm>
+        </p:spPr>
+        <p:txBody>
+          <a:bodyPr/>
+          <a:lstStyle/>
+          <a:p>
+            <a:r>
+              <a:rPr lang="en-US" dirty="0"/>
+              <a:t>American Football Rules</a:t>
+            </a:r>
+          </a:p>
+        </p:txBody>
+      </p:sp>
+      <p:sp>
+        <p:nvSpPr>
+          <p:cNvPr id="3" name="Content Placeholder 2">
+            <a:extLst>
+              <a:ext uri="{FF2B5EF4-FFF2-40B4-BE49-F238E27FC236}">
+                <a16:creationId xmlns:a16="http://schemas.microsoft.com/office/drawing/2014/main" id="{7ADB58F6-E2E0-CAA7-B376-A508B298EEED}"/>
+              </a:ext>
+            </a:extLst>
+          </p:cNvPr>
+          <p:cNvSpPr>
+            <a:spLocks noGrp="1"/>
+          </p:cNvSpPr>
+          <p:nvPr>
+            <p:ph idx="1"/>
+          </p:nvPr>
+        </p:nvSpPr>
+        <p:spPr>
+          <a:xfrm>
+            <a:off x="130841" y="510398"/>
+            <a:ext cx="4017413" cy="3394075"/>
+          </a:xfrm>
+        </p:spPr>
+        <p:txBody>
+          <a:bodyPr/>
+          <a:lstStyle/>
+          <a:p>
+            <a:r>
+              <a:rPr lang="en-US" sz="2800" dirty="0"/>
+              <a:t>Games last for 4 quarters of 15 minutes each.</a:t>
+            </a:r>
+          </a:p>
+          <a:p>
+            <a:r>
+              <a:rPr lang="en-US" sz="2800" dirty="0"/>
+              <a:t>Each team has 4 downs(attempts) to gain 10 or more yards.</a:t>
+            </a:r>
+          </a:p>
+          <a:p>
+            <a:r>
+              <a:rPr lang="en-US" sz="2800" dirty="0"/>
+              <a:t>Yards are gained by running with ball or passing it to receiver</a:t>
+            </a:r>
+          </a:p>
+        </p:txBody>
+      </p:sp>
+      <p:sp>
+        <p:nvSpPr>
+          <p:cNvPr id="5" name="Slide Number Placeholder 4">
+            <a:extLst>
+              <a:ext uri="{FF2B5EF4-FFF2-40B4-BE49-F238E27FC236}">
+                <a16:creationId xmlns:a16="http://schemas.microsoft.com/office/drawing/2014/main" id="{47973193-313C-EDCA-41A8-3C31921305EB}"/>
+              </a:ext>
+            </a:extLst>
+          </p:cNvPr>
+          <p:cNvSpPr>
+            <a:spLocks noGrp="1"/>
+          </p:cNvSpPr>
+          <p:nvPr>
+            <p:ph type="sldNum" sz="quarter" idx="12"/>
+          </p:nvPr>
+        </p:nvSpPr>
+        <p:spPr/>
+        <p:txBody>
+          <a:bodyPr/>
+          <a:lstStyle/>
+          <a:p>
+            <a:fld id="{05E21D09-E2E8-7442-AC2A-C17B561ACE37}" type="slidenum">
+              <a:rPr lang="en-US" altLang="en-US" smtClean="0"/>
+              <a:pPr/>
+              <a:t>4</a:t>
+            </a:fld>
+            <a:endParaRPr lang="en-US" altLang="en-US" dirty="0"/>
+          </a:p>
+        </p:txBody>
+      </p:sp>
+      <p:pic>
+        <p:nvPicPr>
+          <p:cNvPr id="9" name="Picture 8" descr="A football players on a field">
+            <a:extLst>
+              <a:ext uri="{FF2B5EF4-FFF2-40B4-BE49-F238E27FC236}">
+                <a16:creationId xmlns:a16="http://schemas.microsoft.com/office/drawing/2014/main" id="{A6B6EA61-E9C2-D0E0-DDAD-7EBA07C831AF}"/>
+              </a:ext>
+            </a:extLst>
+          </p:cNvPr>
+          <p:cNvPicPr>
+            <a:picLocks noChangeAspect="1"/>
+          </p:cNvPicPr>
+          <p:nvPr/>
+        </p:nvPicPr>
+        <p:blipFill>
+          <a:blip r:embed="rId2"/>
+          <a:stretch>
+            <a:fillRect/>
+          </a:stretch>
+        </p:blipFill>
+        <p:spPr>
+          <a:xfrm>
+            <a:off x="4408449" y="1428902"/>
+            <a:ext cx="4453054" cy="2475571"/>
+          </a:xfrm>
+          <a:prstGeom prst="rect">
+            <a:avLst/>
+          </a:prstGeom>
+        </p:spPr>
+      </p:pic>
+      <p:sp>
+        <p:nvSpPr>
+          <p:cNvPr id="10" name="TextBox 9">
+            <a:extLst>
+              <a:ext uri="{FF2B5EF4-FFF2-40B4-BE49-F238E27FC236}">
+                <a16:creationId xmlns:a16="http://schemas.microsoft.com/office/drawing/2014/main" id="{FC54EA64-ACEE-B976-F84D-F9FFA7188D63}"/>
+              </a:ext>
+            </a:extLst>
+          </p:cNvPr>
+          <p:cNvSpPr txBox="1"/>
+          <p:nvPr/>
+        </p:nvSpPr>
+        <p:spPr>
+          <a:xfrm>
+            <a:off x="5602783" y="4048499"/>
+            <a:ext cx="4644033" cy="523220"/>
+          </a:xfrm>
+          <a:prstGeom prst="rect">
+            <a:avLst/>
+          </a:prstGeom>
+          <a:noFill/>
+        </p:spPr>
+        <p:txBody>
+          <a:bodyPr wrap="square" rtlCol="0">
+            <a:spAutoFit/>
+          </a:bodyPr>
+          <a:lstStyle/>
+          <a:p>
+            <a:r>
+              <a:rPr lang="en-US" sz="1400" dirty="0"/>
+              <a:t>Down marker showing 2</a:t>
+            </a:r>
+            <a:r>
+              <a:rPr lang="en-US" sz="1400" baseline="30000" dirty="0"/>
+              <a:t>nd</a:t>
+            </a:r>
+            <a:r>
+              <a:rPr lang="en-US" sz="1400" dirty="0"/>
+              <a:t> down.</a:t>
+            </a:r>
+          </a:p>
+          <a:p>
+            <a:r>
+              <a:rPr lang="en-US" sz="1400" dirty="0"/>
+              <a:t>Source: US Navy</a:t>
+            </a:r>
+          </a:p>
+        </p:txBody>
+      </p:sp>
+    </p:spTree>
+    <p:extLst>
+      <p:ext uri="{BB962C8B-B14F-4D97-AF65-F5344CB8AC3E}">
+        <p14:creationId xmlns:p14="http://schemas.microsoft.com/office/powerpoint/2010/main" val="2635611898"/>
+      </p:ext>
+    </p:extLst>
+  </p:cSld>
+  <p:clrMapOvr>
+    <a:masterClrMapping/>
+  </p:clrMapOvr>
+</p:sld>
+</file>
+
+<file path=ppt/slides/slide5.xml><?xml version="1.0" encoding="utf-8"?>
+<p:sld xmlns:a="http://schemas.openxmlformats.org/drawingml/2006/main" xmlns:r="http://schemas.openxmlformats.org/officeDocument/2006/relationships" xmlns:p="http://schemas.openxmlformats.org/presentationml/2006/main">
+  <p:cSld>
+    <p:spTree>
+      <p:nvGrpSpPr>
+        <p:cNvPr id="1" name=""/>
+        <p:cNvGrpSpPr/>
+        <p:nvPr/>
+      </p:nvGrpSpPr>
+      <p:grpSpPr>
+        <a:xfrm>
+          <a:off x="0" y="0"/>
+          <a:ext cx="0" cy="0"/>
+          <a:chOff x="0" y="0"/>
+          <a:chExt cx="0" cy="0"/>
+        </a:xfrm>
+      </p:grpSpPr>
+      <p:sp>
+        <p:nvSpPr>
+          <p:cNvPr id="3" name="Content Placeholder 2">
+            <a:extLst>
+              <a:ext uri="{FF2B5EF4-FFF2-40B4-BE49-F238E27FC236}">
+                <a16:creationId xmlns:a16="http://schemas.microsoft.com/office/drawing/2014/main" id="{83781D78-08A8-B2D2-B859-7EF4FDE31D23}"/>
+              </a:ext>
+            </a:extLst>
+          </p:cNvPr>
+          <p:cNvSpPr>
+            <a:spLocks noGrp="1"/>
+          </p:cNvSpPr>
+          <p:nvPr>
+            <p:ph idx="1"/>
+          </p:nvPr>
+        </p:nvSpPr>
+        <p:spPr>
+          <a:xfrm>
+            <a:off x="182881" y="731520"/>
+            <a:ext cx="4693920" cy="3662060"/>
+          </a:xfrm>
+        </p:spPr>
+        <p:txBody>
+          <a:bodyPr/>
+          <a:lstStyle/>
+          <a:p>
+            <a:r>
+              <a:rPr lang="en-US" sz="2800" dirty="0"/>
+              <a:t>A </a:t>
+            </a:r>
+            <a:r>
+              <a:rPr lang="en-US" sz="2800" b="1" dirty="0"/>
+              <a:t>play</a:t>
+            </a:r>
+            <a:r>
+              <a:rPr lang="en-US" sz="2800" dirty="0"/>
+              <a:t> is a plan or strategy used to move the ball down the field.</a:t>
+            </a:r>
+          </a:p>
+          <a:p>
+            <a:pPr lvl="1"/>
+            <a:r>
+              <a:rPr lang="en-US" sz="2400" dirty="0"/>
+              <a:t>Pass: Ball thrown by a player</a:t>
+            </a:r>
+          </a:p>
+          <a:p>
+            <a:pPr lvl="1"/>
+            <a:r>
+              <a:rPr lang="en-US" sz="2400" dirty="0"/>
+              <a:t>Rush: Running with the ball</a:t>
+            </a:r>
+          </a:p>
+          <a:p>
+            <a:pPr lvl="1"/>
+            <a:r>
+              <a:rPr lang="en-US" sz="2400" dirty="0"/>
+              <a:t>Touchdown: Advancing ball to opponent end zone. Worth 6 points</a:t>
+            </a:r>
+          </a:p>
+        </p:txBody>
+      </p:sp>
+      <p:sp>
+        <p:nvSpPr>
+          <p:cNvPr id="5" name="Slide Number Placeholder 4">
+            <a:extLst>
+              <a:ext uri="{FF2B5EF4-FFF2-40B4-BE49-F238E27FC236}">
+                <a16:creationId xmlns:a16="http://schemas.microsoft.com/office/drawing/2014/main" id="{6C500CA5-AE6C-1562-0EBD-2B8093A1CCBE}"/>
+              </a:ext>
+            </a:extLst>
+          </p:cNvPr>
+          <p:cNvSpPr>
+            <a:spLocks noGrp="1"/>
+          </p:cNvSpPr>
+          <p:nvPr>
+            <p:ph type="sldNum" sz="quarter" idx="12"/>
+          </p:nvPr>
+        </p:nvSpPr>
+        <p:spPr/>
+        <p:txBody>
+          <a:bodyPr/>
+          <a:lstStyle/>
+          <a:p>
+            <a:fld id="{05E21D09-E2E8-7442-AC2A-C17B561ACE37}" type="slidenum">
+              <a:rPr lang="en-US" altLang="en-US" smtClean="0"/>
+              <a:pPr/>
+              <a:t>5</a:t>
+            </a:fld>
+            <a:endParaRPr lang="en-US" altLang="en-US"/>
+          </a:p>
+        </p:txBody>
+      </p:sp>
+      <p:sp>
+        <p:nvSpPr>
+          <p:cNvPr id="6" name="Title 1">
+            <a:extLst>
+              <a:ext uri="{FF2B5EF4-FFF2-40B4-BE49-F238E27FC236}">
+                <a16:creationId xmlns:a16="http://schemas.microsoft.com/office/drawing/2014/main" id="{EADAC097-8B9B-0314-DF71-45340F952FE6}"/>
+              </a:ext>
+            </a:extLst>
+          </p:cNvPr>
+          <p:cNvSpPr>
+            <a:spLocks noGrp="1"/>
+          </p:cNvSpPr>
+          <p:nvPr>
+            <p:ph type="title"/>
+          </p:nvPr>
+        </p:nvSpPr>
+        <p:spPr>
+          <a:xfrm>
+            <a:off x="2189782" y="46038"/>
+            <a:ext cx="8229600" cy="457200"/>
+          </a:xfrm>
+        </p:spPr>
+        <p:txBody>
+          <a:bodyPr/>
+          <a:lstStyle/>
+          <a:p>
+            <a:r>
+              <a:rPr lang="en-US" dirty="0"/>
+              <a:t>American Football Rules</a:t>
+            </a:r>
+          </a:p>
+        </p:txBody>
+      </p:sp>
+      <p:pic>
+        <p:nvPicPr>
+          <p:cNvPr id="8" name="Picture 7" descr="A football game with a crowd watching&#10;&#10;Description automatically generated">
+            <a:extLst>
+              <a:ext uri="{FF2B5EF4-FFF2-40B4-BE49-F238E27FC236}">
+                <a16:creationId xmlns:a16="http://schemas.microsoft.com/office/drawing/2014/main" id="{CA276AF7-D0EE-9248-F31F-71D49DD9300B}"/>
+              </a:ext>
+            </a:extLst>
+          </p:cNvPr>
+          <p:cNvPicPr>
+            <a:picLocks noChangeAspect="1"/>
+          </p:cNvPicPr>
+          <p:nvPr/>
+        </p:nvPicPr>
+        <p:blipFill>
+          <a:blip r:embed="rId2"/>
+          <a:stretch>
+            <a:fillRect/>
+          </a:stretch>
+        </p:blipFill>
+        <p:spPr>
+          <a:xfrm>
+            <a:off x="5328425" y="876921"/>
+            <a:ext cx="3358375" cy="2938578"/>
+          </a:xfrm>
+          <a:prstGeom prst="rect">
+            <a:avLst/>
+          </a:prstGeom>
+        </p:spPr>
+      </p:pic>
+      <p:sp>
+        <p:nvSpPr>
+          <p:cNvPr id="10" name="TextBox 9">
+            <a:extLst>
+              <a:ext uri="{FF2B5EF4-FFF2-40B4-BE49-F238E27FC236}">
+                <a16:creationId xmlns:a16="http://schemas.microsoft.com/office/drawing/2014/main" id="{FDA2FA8C-9DC9-29CA-30D1-C74C2A9345C3}"/>
+              </a:ext>
+            </a:extLst>
+          </p:cNvPr>
+          <p:cNvSpPr txBox="1"/>
+          <p:nvPr/>
+        </p:nvSpPr>
+        <p:spPr>
+          <a:xfrm>
+            <a:off x="5906855" y="3897247"/>
+            <a:ext cx="2779945" cy="338554"/>
+          </a:xfrm>
+          <a:prstGeom prst="rect">
+            <a:avLst/>
+          </a:prstGeom>
+          <a:noFill/>
+        </p:spPr>
+        <p:txBody>
+          <a:bodyPr wrap="square">
+            <a:spAutoFit/>
+          </a:bodyPr>
+          <a:lstStyle/>
+          <a:p>
+            <a:r>
+              <a:rPr lang="en-US" sz="1600" dirty="0"/>
+              <a:t>Source: End Zone - Wikipedia</a:t>
+            </a:r>
+          </a:p>
+        </p:txBody>
+      </p:sp>
+    </p:spTree>
+    <p:extLst>
+      <p:ext uri="{BB962C8B-B14F-4D97-AF65-F5344CB8AC3E}">
+        <p14:creationId xmlns:p14="http://schemas.microsoft.com/office/powerpoint/2010/main" val="2979133641"/>
+      </p:ext>
+    </p:extLst>
+  </p:cSld>
+  <p:clrMapOvr>
+    <a:masterClrMapping/>
+  </p:clrMapOvr>
+</p:sld>
+</file>
+
+<file path=ppt/slides/slide6.xml><?xml version="1.0" encoding="utf-8"?>
+<p:sld xmlns:a="http://schemas.openxmlformats.org/drawingml/2006/main" xmlns:r="http://schemas.openxmlformats.org/officeDocument/2006/relationships" xmlns:p="http://schemas.openxmlformats.org/presentationml/2006/main">
+  <p:cSld>
+    <p:spTree>
+      <p:nvGrpSpPr>
+        <p:cNvPr id="1" name=""/>
+        <p:cNvGrpSpPr/>
+        <p:nvPr/>
+      </p:nvGrpSpPr>
+      <p:grpSpPr>
+        <a:xfrm>
+          <a:off x="0" y="0"/>
+          <a:ext cx="0" cy="0"/>
+          <a:chOff x="0" y="0"/>
+          <a:chExt cx="0" cy="0"/>
+        </a:xfrm>
+      </p:grpSpPr>
+      <p:sp>
+        <p:nvSpPr>
+          <p:cNvPr id="2" name="Title 1">
+            <a:extLst>
+              <a:ext uri="{FF2B5EF4-FFF2-40B4-BE49-F238E27FC236}">
                 <a16:creationId xmlns:a16="http://schemas.microsoft.com/office/drawing/2014/main" id="{4FE73518-5A99-D847-A5A0-523710899DB7}"/>
               </a:ext>
             </a:extLst>
@@ -13573,7 +14012,7 @@
 </p:sld>
 </file>
 
-<file path=ppt/slides/slide5.xml><?xml version="1.0" encoding="utf-8"?>
+<file path=ppt/slides/slide7.xml><?xml version="1.0" encoding="utf-8"?>
 <p:sld xmlns:a="http://schemas.openxmlformats.org/drawingml/2006/main" xmlns:r="http://schemas.openxmlformats.org/officeDocument/2006/relationships" xmlns:p="http://schemas.openxmlformats.org/presentationml/2006/main">
   <p:cSld>
     <p:spTree>
@@ -14004,7 +14443,7 @@
 </p:sld>
 </file>
 
-<file path=ppt/slides/slide6.xml><?xml version="1.0" encoding="utf-8"?>
+<file path=ppt/slides/slide8.xml><?xml version="1.0" encoding="utf-8"?>
 <p:sld xmlns:a="http://schemas.openxmlformats.org/drawingml/2006/main" xmlns:r="http://schemas.openxmlformats.org/officeDocument/2006/relationships" xmlns:p="http://schemas.openxmlformats.org/presentationml/2006/main">
   <p:cSld>
     <p:spTree>
@@ -14152,7 +14591,7 @@
 </p:sld>
 </file>
 
-<file path=ppt/slides/slide7.xml><?xml version="1.0" encoding="utf-8"?>
+<file path=ppt/slides/slide9.xml><?xml version="1.0" encoding="utf-8"?>
 <p:sld xmlns:a="http://schemas.openxmlformats.org/drawingml/2006/main" xmlns:r="http://schemas.openxmlformats.org/officeDocument/2006/relationships" xmlns:p="http://schemas.openxmlformats.org/presentationml/2006/main">
   <p:cSld>
     <p:spTree>
@@ -15480,15 +15919,6 @@
 </file>
 
 <file path=customXml/item1.xml><?xml version="1.0" encoding="utf-8"?>
-<p:properties xmlns:p="http://schemas.microsoft.com/office/2006/metadata/properties" xmlns:xsi="http://www.w3.org/2001/XMLSchema-instance" xmlns:pc="http://schemas.microsoft.com/office/infopath/2007/PartnerControls">
-  <documentManagement>
-    <_Version xmlns="http://schemas.microsoft.com/sharepoint/v3/fields" xsi:nil="true"/>
-    <_Status xmlns="http://schemas.microsoft.com/sharepoint/v3/fields" xsi:nil="true"/>
-  </documentManagement>
-</p:properties>
-</file>
-
-<file path=customXml/item2.xml><?xml version="1.0" encoding="utf-8"?>
 <ct:contentTypeSchema xmlns:ct="http://schemas.microsoft.com/office/2006/metadata/contentType" xmlns:ma="http://schemas.microsoft.com/office/2006/metadata/properties/metaAttributes" ct:_="" ma:_="" ma:contentTypeName="Document" ma:contentTypeID="0x0101000DE64AEEDD9B7A4D93545ACBE97D4615" ma:contentTypeVersion="2" ma:contentTypeDescription="Create a new document." ma:contentTypeScope="" ma:versionID="f49002b78e3a4a71b814eef46a983816">
   <xsd:schema xmlns:xsd="http://www.w3.org/2001/XMLSchema" xmlns:xs="http://www.w3.org/2001/XMLSchema" xmlns:p="http://schemas.microsoft.com/office/2006/metadata/properties" xmlns:ns2="http://schemas.microsoft.com/sharepoint/v3/fields" targetNamespace="http://schemas.microsoft.com/office/2006/metadata/properties" ma:root="true" ma:fieldsID="38f6db2dd0d9a0cf6a8dc37be32b365b" ns2:_="">
     <xsd:import namespace="http://schemas.microsoft.com/sharepoint/v3/fields"/>
@@ -15632,23 +16062,16 @@
 </ct:contentTypeSchema>
 </file>
 
-<file path=customXml/itemProps1.xml><?xml version="1.0" encoding="utf-8"?>
-<ds:datastoreItem xmlns:ds="http://schemas.openxmlformats.org/officeDocument/2006/customXml" ds:itemID="{7B6F2769-7194-4217-93D3-3AF3A4742282}">
-  <ds:schemaRefs>
-    <ds:schemaRef ds:uri="http://schemas.openxmlformats.org/package/2006/metadata/core-properties"/>
-    <ds:schemaRef ds:uri="http://purl.org/dc/terms/"/>
-    <ds:schemaRef ds:uri="http://purl.org/dc/elements/1.1/"/>
-    <ds:schemaRef ds:uri="http://schemas.microsoft.com/office/2006/metadata/properties"/>
-    <ds:schemaRef ds:uri="http://purl.org/dc/dcmitype/"/>
-    <ds:schemaRef ds:uri="http://schemas.microsoft.com/office/2006/documentManagement/types"/>
-    <ds:schemaRef ds:uri="http://schemas.microsoft.com/office/infopath/2007/PartnerControls"/>
-    <ds:schemaRef ds:uri="http://schemas.microsoft.com/sharepoint/v3/fields"/>
-    <ds:schemaRef ds:uri="http://www.w3.org/XML/1998/namespace"/>
-  </ds:schemaRefs>
-</ds:datastoreItem>
+<file path=customXml/item2.xml><?xml version="1.0" encoding="utf-8"?>
+<p:properties xmlns:p="http://schemas.microsoft.com/office/2006/metadata/properties" xmlns:xsi="http://www.w3.org/2001/XMLSchema-instance" xmlns:pc="http://schemas.microsoft.com/office/infopath/2007/PartnerControls">
+  <documentManagement>
+    <_Version xmlns="http://schemas.microsoft.com/sharepoint/v3/fields" xsi:nil="true"/>
+    <_Status xmlns="http://schemas.microsoft.com/sharepoint/v3/fields" xsi:nil="true"/>
+  </documentManagement>
+</p:properties>
 </file>
 
-<file path=customXml/itemProps2.xml><?xml version="1.0" encoding="utf-8"?>
+<file path=customXml/itemProps1.xml><?xml version="1.0" encoding="utf-8"?>
 <ds:datastoreItem xmlns:ds="http://schemas.openxmlformats.org/officeDocument/2006/customXml" ds:itemID="{E4214858-785C-42F7-BE66-6D0E79395FC8}">
   <ds:schemaRefs>
     <ds:schemaRef ds:uri="http://schemas.microsoft.com/office/2006/metadata/contentType"/>
@@ -15664,4 +16087,20 @@
     <ds:schemaRef ds:uri="http://schemas.microsoft.com/internal/obd"/>
   </ds:schemaRefs>
 </ds:datastoreItem>
+</file>
+
+<file path=customXml/itemProps2.xml><?xml version="1.0" encoding="utf-8"?>
+<ds:datastoreItem xmlns:ds="http://schemas.openxmlformats.org/officeDocument/2006/customXml" ds:itemID="{7B6F2769-7194-4217-93D3-3AF3A4742282}">
+  <ds:schemaRefs>
+    <ds:schemaRef ds:uri="http://schemas.openxmlformats.org/package/2006/metadata/core-properties"/>
+    <ds:schemaRef ds:uri="http://purl.org/dc/terms/"/>
+    <ds:schemaRef ds:uri="http://purl.org/dc/elements/1.1/"/>
+    <ds:schemaRef ds:uri="http://schemas.microsoft.com/office/2006/metadata/properties"/>
+    <ds:schemaRef ds:uri="http://purl.org/dc/dcmitype/"/>
+    <ds:schemaRef ds:uri="http://schemas.microsoft.com/office/2006/documentManagement/types"/>
+    <ds:schemaRef ds:uri="http://schemas.microsoft.com/office/infopath/2007/PartnerControls"/>
+    <ds:schemaRef ds:uri="http://schemas.microsoft.com/sharepoint/v3/fields"/>
+    <ds:schemaRef ds:uri="http://www.w3.org/XML/1998/namespace"/>
+  </ds:schemaRefs>
+</ds:datastoreItem>
 </file>
</xml_diff>